<commit_message>
Update to powerpoint: - aero architecture discussion - marine architecture discussion
</commit_message>
<xml_diff>
--- a/notes/IPSOMEDT Marine_MATLAB discussion.pptx
+++ b/notes/IPSOMEDT Marine_MATLAB discussion.pptx
@@ -5,58 +5,60 @@
     <p:sldMasterId id="2147483904" r:id="rId1"/>
   </p:sldMasterIdLst>
   <p:notesMasterIdLst>
-    <p:notesMasterId r:id="rId13"/>
+    <p:notesMasterId r:id="rId15"/>
   </p:notesMasterIdLst>
   <p:handoutMasterIdLst>
-    <p:handoutMasterId r:id="rId14"/>
+    <p:handoutMasterId r:id="rId16"/>
   </p:handoutMasterIdLst>
   <p:sldIdLst>
     <p:sldId id="500" r:id="rId2"/>
     <p:sldId id="533" r:id="rId3"/>
-    <p:sldId id="524" r:id="rId4"/>
-    <p:sldId id="525" r:id="rId5"/>
-    <p:sldId id="526" r:id="rId6"/>
-    <p:sldId id="528" r:id="rId7"/>
-    <p:sldId id="529" r:id="rId8"/>
-    <p:sldId id="530" r:id="rId9"/>
-    <p:sldId id="531" r:id="rId10"/>
-    <p:sldId id="534" r:id="rId11"/>
-    <p:sldId id="532" r:id="rId12"/>
+    <p:sldId id="547" r:id="rId4"/>
+    <p:sldId id="524" r:id="rId5"/>
+    <p:sldId id="525" r:id="rId6"/>
+    <p:sldId id="526" r:id="rId7"/>
+    <p:sldId id="528" r:id="rId8"/>
+    <p:sldId id="529" r:id="rId9"/>
+    <p:sldId id="530" r:id="rId10"/>
+    <p:sldId id="531" r:id="rId11"/>
+    <p:sldId id="535" r:id="rId12"/>
+    <p:sldId id="532" r:id="rId13"/>
+    <p:sldId id="534" r:id="rId14"/>
   </p:sldIdLst>
   <p:sldSz cx="9144000" cy="5143500" type="screen16x9"/>
   <p:notesSz cx="6858000" cy="9144000"/>
   <p:embeddedFontLst>
     <p:embeddedFont>
       <p:font typeface="Calibri" panose="020F0502020204030204" pitchFamily="34" charset="0"/>
-      <p:regular r:id="rId15"/>
-      <p:bold r:id="rId16"/>
-      <p:italic r:id="rId17"/>
-      <p:boldItalic r:id="rId18"/>
+      <p:regular r:id="rId17"/>
+      <p:bold r:id="rId18"/>
+      <p:italic r:id="rId19"/>
+      <p:boldItalic r:id="rId20"/>
     </p:embeddedFont>
     <p:embeddedFont>
       <p:font typeface="RR Pioneer" panose="020B0604020202020204" charset="0"/>
-      <p:regular r:id="rId19"/>
-      <p:bold r:id="rId20"/>
-      <p:italic r:id="rId21"/>
-      <p:boldItalic r:id="rId22"/>
+      <p:regular r:id="rId21"/>
+      <p:bold r:id="rId22"/>
+      <p:italic r:id="rId23"/>
+      <p:boldItalic r:id="rId24"/>
     </p:embeddedFont>
     <p:embeddedFont>
       <p:font typeface="RR Pioneer Bold" panose="020B0604020202020204" charset="0"/>
-      <p:regular r:id="rId23"/>
-      <p:bold r:id="rId24"/>
+      <p:regular r:id="rId25"/>
+      <p:bold r:id="rId26"/>
     </p:embeddedFont>
     <p:embeddedFont>
       <p:font typeface="RR Pioneer Light Condensed" panose="020B0604020202020204" charset="0"/>
-      <p:regular r:id="rId25"/>
+      <p:regular r:id="rId27"/>
     </p:embeddedFont>
     <p:embeddedFont>
       <p:font typeface="RR Pioneer Medium" panose="020B0604020202020204" charset="0"/>
-      <p:regular r:id="rId26"/>
-      <p:italic r:id="rId27"/>
+      <p:regular r:id="rId28"/>
+      <p:italic r:id="rId29"/>
     </p:embeddedFont>
     <p:embeddedFont>
       <p:font typeface="RR Pioneer UltraLight Condensed" panose="020B0604020202020204" charset="0"/>
-      <p:regular r:id="rId28"/>
+      <p:regular r:id="rId30"/>
     </p:embeddedFont>
   </p:embeddedFontLst>
   <p:defaultTextStyle>
@@ -638,7 +640,7 @@
           <a:p>
             <a:fld id="{F0C97406-1CCB-4617-AA56-4A8880DBEAF0}" type="datetimeFigureOut">
               <a:rPr lang="en-GB" smtClean="0"/>
-              <a:t>08/06/2022</a:t>
+              <a:t>13/06/2022</a:t>
             </a:fld>
             <a:endParaRPr lang="en-GB"/>
           </a:p>
@@ -971,7 +973,7 @@
           <a:p>
             <a:fld id="{57B6AAE9-A8BC-48FD-92FA-80EC32FDAD2D}" type="slidenum">
               <a:rPr lang="en-GB" smtClean="0"/>
-              <a:t>10</a:t>
+              <a:t>13</a:t>
             </a:fld>
             <a:endParaRPr lang="en-GB"/>
           </a:p>
@@ -23854,10 +23856,45 @@
       </p:grpSpPr>
       <p:sp>
         <p:nvSpPr>
+          <p:cNvPr id="2" name="Title 1">
+            <a:extLst>
+              <a:ext uri="{FF2B5EF4-FFF2-40B4-BE49-F238E27FC236}">
+                <a16:creationId xmlns:a16="http://schemas.microsoft.com/office/drawing/2014/main" id="{5B812A57-3B75-B9DA-FB76-AEB8686F8976}"/>
+              </a:ext>
+            </a:extLst>
+          </p:cNvPr>
+          <p:cNvSpPr>
+            <a:spLocks noGrp="1"/>
+          </p:cNvSpPr>
+          <p:nvPr>
+            <p:ph type="title"/>
+          </p:nvPr>
+        </p:nvSpPr>
+        <p:spPr>
+          <a:xfrm>
+            <a:off x="2724547" y="328344"/>
+            <a:ext cx="5836835" cy="695484"/>
+          </a:xfrm>
+        </p:spPr>
+        <p:txBody>
+          <a:bodyPr anchor="ctr"/>
+          <a:lstStyle/>
+          <a:p>
+            <a:pPr algn="ctr"/>
+            <a:r>
+              <a:rPr lang="en-US" dirty="0"/>
+              <a:t>Feature-wise callbacks to construct communication between GUI and code</a:t>
+            </a:r>
+            <a:endParaRPr lang="en-SG" dirty="0"/>
+          </a:p>
+        </p:txBody>
+      </p:sp>
+      <p:sp>
+        <p:nvSpPr>
           <p:cNvPr id="3" name="Text Placeholder 2">
             <a:extLst>
               <a:ext uri="{FF2B5EF4-FFF2-40B4-BE49-F238E27FC236}">
-                <a16:creationId xmlns:a16="http://schemas.microsoft.com/office/drawing/2014/main" id="{9C5C3248-2370-C9E3-11C1-066948834FAB}"/>
+                <a16:creationId xmlns:a16="http://schemas.microsoft.com/office/drawing/2014/main" id="{23936BCC-02D6-EFE8-8BA6-BCF909638E61}"/>
               </a:ext>
             </a:extLst>
           </p:cNvPr>
@@ -23875,97 +23912,46 @@
           <a:p>
             <a:r>
               <a:rPr lang="en-US" dirty="0"/>
-              <a:t>Summary</a:t>
+              <a:t>High-level Architecture</a:t>
             </a:r>
             <a:endParaRPr lang="en-SG" dirty="0"/>
           </a:p>
         </p:txBody>
       </p:sp>
-      <p:sp>
-        <p:nvSpPr>
-          <p:cNvPr id="4" name="Text Placeholder 3">
-            <a:extLst>
-              <a:ext uri="{FF2B5EF4-FFF2-40B4-BE49-F238E27FC236}">
-                <a16:creationId xmlns:a16="http://schemas.microsoft.com/office/drawing/2014/main" id="{50065642-D86B-279C-5916-A4D37347D297}"/>
-              </a:ext>
-            </a:extLst>
-          </p:cNvPr>
-          <p:cNvSpPr>
-            <a:spLocks noGrp="1"/>
-          </p:cNvSpPr>
-          <p:nvPr>
-            <p:ph type="body" sz="quarter" idx="11"/>
-          </p:nvPr>
-        </p:nvSpPr>
-        <p:spPr>
-          <a:xfrm>
-            <a:off x="2904430" y="1258887"/>
-            <a:ext cx="5836835" cy="2625725"/>
-          </a:xfrm>
-        </p:spPr>
-        <p:txBody>
-          <a:bodyPr/>
-          <a:lstStyle/>
-          <a:p>
-            <a:pPr marL="342900" indent="-342900">
-              <a:buAutoNum type="arabicPeriod"/>
-            </a:pPr>
-            <a:r>
-              <a:rPr lang="en-US" dirty="0"/>
-              <a:t>Refactors user-defined utility functions to another file</a:t>
-            </a:r>
-          </a:p>
-          <a:p>
-            <a:pPr marL="342900" indent="-342900">
-              <a:buAutoNum type="arabicPeriod"/>
-            </a:pPr>
-            <a:r>
-              <a:rPr lang="en-US" dirty="0"/>
-              <a:t>Refactors user-defined libraries to another file</a:t>
-            </a:r>
-          </a:p>
-          <a:p>
-            <a:pPr marL="342900" indent="-342900">
-              <a:buAutoNum type="arabicPeriod"/>
-            </a:pPr>
-            <a:r>
-              <a:rPr lang="en-US" dirty="0"/>
-              <a:t>Uses properties and structures to organize variables</a:t>
-            </a:r>
-          </a:p>
-          <a:p>
-            <a:pPr marL="342900" indent="-342900">
-              <a:buAutoNum type="arabicPeriod"/>
-            </a:pPr>
-            <a:r>
-              <a:rPr lang="en-US" dirty="0"/>
-              <a:t>Callbacks</a:t>
-            </a:r>
-          </a:p>
-          <a:p>
-            <a:pPr marL="342900" indent="-342900">
-              <a:buAutoNum type="arabicPeriod"/>
-            </a:pPr>
-            <a:r>
-              <a:rPr lang="en-US" dirty="0"/>
-              <a:t>Decreases memory usage by reducing the number of temporary variables</a:t>
-            </a:r>
-          </a:p>
-          <a:p>
-            <a:pPr marL="342900" indent="-342900">
-              <a:buAutoNum type="arabicPeriod"/>
-            </a:pPr>
-            <a:r>
-              <a:rPr lang="en-US" dirty="0"/>
-              <a:t>Vectorization</a:t>
-            </a:r>
-          </a:p>
-        </p:txBody>
-      </p:sp>
+      <p:pic>
+        <p:nvPicPr>
+          <p:cNvPr id="5" name="Picture 4">
+            <a:extLst>
+              <a:ext uri="{FF2B5EF4-FFF2-40B4-BE49-F238E27FC236}">
+                <a16:creationId xmlns:a16="http://schemas.microsoft.com/office/drawing/2014/main" id="{19C816E3-EDFB-A607-66DD-E0CA9C09CEF0}"/>
+              </a:ext>
+            </a:extLst>
+          </p:cNvPr>
+          <p:cNvPicPr>
+            <a:picLocks noChangeAspect="1"/>
+          </p:cNvPicPr>
+          <p:nvPr/>
+        </p:nvPicPr>
+        <p:blipFill>
+          <a:blip r:embed="rId2"/>
+          <a:stretch>
+            <a:fillRect/>
+          </a:stretch>
+        </p:blipFill>
+        <p:spPr>
+          <a:xfrm>
+            <a:off x="4559425" y="1191552"/>
+            <a:ext cx="2167077" cy="3505566"/>
+          </a:xfrm>
+          <a:prstGeom prst="rect">
+            <a:avLst/>
+          </a:prstGeom>
+        </p:spPr>
+      </p:pic>
     </p:spTree>
     <p:extLst>
       <p:ext uri="{BB962C8B-B14F-4D97-AF65-F5344CB8AC3E}">
-        <p14:creationId xmlns:p14="http://schemas.microsoft.com/office/powerpoint/2010/main" val="4228211284"/>
+        <p14:creationId xmlns:p14="http://schemas.microsoft.com/office/powerpoint/2010/main" val="2060025825"/>
       </p:ext>
     </p:extLst>
   </p:cSld>
@@ -23997,7 +23983,7 @@
           <p:cNvPr id="3" name="Text Placeholder 2">
             <a:extLst>
               <a:ext uri="{FF2B5EF4-FFF2-40B4-BE49-F238E27FC236}">
-                <a16:creationId xmlns:a16="http://schemas.microsoft.com/office/drawing/2014/main" id="{B4976BEF-FA02-9111-2820-841814131FB6}"/>
+                <a16:creationId xmlns:a16="http://schemas.microsoft.com/office/drawing/2014/main" id="{269B9567-C4DB-C696-573E-D778A8FC7F64}"/>
               </a:ext>
             </a:extLst>
           </p:cNvPr>
@@ -24014,10 +24000,9 @@
           <a:lstStyle/>
           <a:p>
             <a:r>
-              <a:rPr lang="en-US" dirty="0"/>
-              <a:t>Potential Issues</a:t>
-            </a:r>
-            <a:endParaRPr lang="en-SG" dirty="0"/>
+              <a:rPr lang="en-SG" dirty="0"/>
+              <a:t>Software architecture</a:t>
+            </a:r>
           </a:p>
         </p:txBody>
       </p:sp>
@@ -24026,7 +24011,7 @@
           <p:cNvPr id="4" name="Text Placeholder 3">
             <a:extLst>
               <a:ext uri="{FF2B5EF4-FFF2-40B4-BE49-F238E27FC236}">
-                <a16:creationId xmlns:a16="http://schemas.microsoft.com/office/drawing/2014/main" id="{CC177288-813A-1DF9-0369-8F1A1D8233F5}"/>
+                <a16:creationId xmlns:a16="http://schemas.microsoft.com/office/drawing/2014/main" id="{A3887B8D-B8E2-C7C1-ADC8-498E6F43E971}"/>
               </a:ext>
             </a:extLst>
           </p:cNvPr>
@@ -24039,13 +24024,133 @@
         </p:nvSpPr>
         <p:spPr>
           <a:xfrm>
-            <a:off x="2956894" y="1258887"/>
-            <a:ext cx="5836835" cy="1312863"/>
+            <a:off x="2777013" y="908276"/>
+            <a:ext cx="5836835" cy="2996662"/>
           </a:xfrm>
         </p:spPr>
         <p:txBody>
           <a:bodyPr>
-            <a:normAutofit fontScale="92500" lnSpcReduction="10000"/>
+            <a:normAutofit/>
+          </a:bodyPr>
+          <a:lstStyle/>
+          <a:p>
+            <a:pPr algn="just"/>
+            <a:r>
+              <a:rPr lang="en-US" dirty="0"/>
+              <a:t>Adapt a </a:t>
+            </a:r>
+            <a:r>
+              <a:rPr lang="en-US" b="1" dirty="0"/>
+              <a:t>microkernel architecture</a:t>
+            </a:r>
+            <a:r>
+              <a:rPr lang="en-US" dirty="0"/>
+              <a:t>: The system consists of two major components, namely a core system and plug-in modules. The core system handles the fundamental and minimal operations of the application, while the plug-in modules handle the extended functionalities (like extra features) and customized processing. </a:t>
+            </a:r>
+          </a:p>
+          <a:p>
+            <a:pPr lvl="1" algn="just"/>
+            <a:r>
+              <a:rPr lang="en-SG" dirty="0"/>
+              <a:t>Advantage: Easiness of feature expansion (i.e., scalability), code understanding without understanding every module (i.e., readability).</a:t>
+            </a:r>
+          </a:p>
+          <a:p>
+            <a:pPr lvl="1" algn="just"/>
+            <a:r>
+              <a:rPr lang="en-SG" dirty="0"/>
+              <a:t>Disadvantage: Maintainability, reusability.</a:t>
+            </a:r>
+          </a:p>
+          <a:p>
+            <a:endParaRPr lang="en-SG" dirty="0"/>
+          </a:p>
+        </p:txBody>
+      </p:sp>
+    </p:spTree>
+    <p:extLst>
+      <p:ext uri="{BB962C8B-B14F-4D97-AF65-F5344CB8AC3E}">
+        <p14:creationId xmlns:p14="http://schemas.microsoft.com/office/powerpoint/2010/main" val="2729510093"/>
+      </p:ext>
+    </p:extLst>
+  </p:cSld>
+  <p:clrMapOvr>
+    <a:masterClrMapping/>
+  </p:clrMapOvr>
+</p:sld>
+</file>
+
+<file path=ppt/slides/slide12.xml><?xml version="1.0" encoding="utf-8"?>
+<p:sld xmlns:a="http://schemas.openxmlformats.org/drawingml/2006/main" xmlns:r="http://schemas.openxmlformats.org/officeDocument/2006/relationships" xmlns:p="http://schemas.openxmlformats.org/presentationml/2006/main">
+  <p:cSld>
+    <p:spTree>
+      <p:nvGrpSpPr>
+        <p:cNvPr id="1" name=""/>
+        <p:cNvGrpSpPr/>
+        <p:nvPr/>
+      </p:nvGrpSpPr>
+      <p:grpSpPr>
+        <a:xfrm>
+          <a:off x="0" y="0"/>
+          <a:ext cx="0" cy="0"/>
+          <a:chOff x="0" y="0"/>
+          <a:chExt cx="0" cy="0"/>
+        </a:xfrm>
+      </p:grpSpPr>
+      <p:sp>
+        <p:nvSpPr>
+          <p:cNvPr id="3" name="Text Placeholder 2">
+            <a:extLst>
+              <a:ext uri="{FF2B5EF4-FFF2-40B4-BE49-F238E27FC236}">
+                <a16:creationId xmlns:a16="http://schemas.microsoft.com/office/drawing/2014/main" id="{B4976BEF-FA02-9111-2820-841814131FB6}"/>
+              </a:ext>
+            </a:extLst>
+          </p:cNvPr>
+          <p:cNvSpPr>
+            <a:spLocks noGrp="1"/>
+          </p:cNvSpPr>
+          <p:nvPr>
+            <p:ph type="body" sz="quarter" idx="10"/>
+          </p:nvPr>
+        </p:nvSpPr>
+        <p:spPr/>
+        <p:txBody>
+          <a:bodyPr/>
+          <a:lstStyle/>
+          <a:p>
+            <a:r>
+              <a:rPr lang="en-US" dirty="0"/>
+              <a:t>Potential Issues</a:t>
+            </a:r>
+            <a:endParaRPr lang="en-SG" dirty="0"/>
+          </a:p>
+        </p:txBody>
+      </p:sp>
+      <p:sp>
+        <p:nvSpPr>
+          <p:cNvPr id="4" name="Text Placeholder 3">
+            <a:extLst>
+              <a:ext uri="{FF2B5EF4-FFF2-40B4-BE49-F238E27FC236}">
+                <a16:creationId xmlns:a16="http://schemas.microsoft.com/office/drawing/2014/main" id="{CC177288-813A-1DF9-0369-8F1A1D8233F5}"/>
+              </a:ext>
+            </a:extLst>
+          </p:cNvPr>
+          <p:cNvSpPr>
+            <a:spLocks noGrp="1"/>
+          </p:cNvSpPr>
+          <p:nvPr>
+            <p:ph type="body" sz="quarter" idx="11"/>
+          </p:nvPr>
+        </p:nvSpPr>
+        <p:spPr>
+          <a:xfrm>
+            <a:off x="2877947" y="1028250"/>
+            <a:ext cx="5836835" cy="1671403"/>
+          </a:xfrm>
+        </p:spPr>
+        <p:txBody>
+          <a:bodyPr>
+            <a:normAutofit/>
           </a:bodyPr>
           <a:lstStyle/>
           <a:p>
@@ -24060,7 +24165,7 @@
             </a:pPr>
             <a:r>
               <a:rPr lang="en-US" dirty="0"/>
-              <a:t>Loading the mlapp file is slow (i.e., loading the existing files and codes)</a:t>
+              <a:t>Loading the mlapp file is slow (i.e., loading the existing files and codes).</a:t>
             </a:r>
           </a:p>
           <a:p>
@@ -24069,7 +24174,7 @@
             </a:pPr>
             <a:r>
               <a:rPr lang="en-US" dirty="0"/>
-              <a:t>The editor is slow and delayed</a:t>
+              <a:t>The editor is slow and delayed.</a:t>
             </a:r>
           </a:p>
           <a:p>
@@ -24078,7 +24183,7 @@
             </a:pPr>
             <a:r>
               <a:rPr lang="en-US" dirty="0"/>
-              <a:t>Compiling and running the mlapp file is slow after clicking the ‘save’ and ‘run’ buttons</a:t>
+              <a:t>Compiling and running the mlapp file is slow after clicking the ‘save’ and ‘run’ buttons.</a:t>
             </a:r>
           </a:p>
           <a:p>
@@ -24087,7 +24192,149 @@
             </a:pPr>
             <a:r>
               <a:rPr lang="en-SG" dirty="0"/>
-              <a:t>For now, the lagging is still tolerable. But when the mlapp file becomes larger, we foresee the delay will be substantial</a:t>
+              <a:t>For now, the lagging is still tolerable. But when the mlapp file becomes larger, we foresee the delay will be substantial.</a:t>
+            </a:r>
+          </a:p>
+        </p:txBody>
+      </p:sp>
+    </p:spTree>
+    <p:extLst>
+      <p:ext uri="{BB962C8B-B14F-4D97-AF65-F5344CB8AC3E}">
+        <p14:creationId xmlns:p14="http://schemas.microsoft.com/office/powerpoint/2010/main" val="2509604075"/>
+      </p:ext>
+    </p:extLst>
+  </p:cSld>
+  <p:clrMapOvr>
+    <a:masterClrMapping/>
+  </p:clrMapOvr>
+</p:sld>
+</file>
+
+<file path=ppt/slides/slide13.xml><?xml version="1.0" encoding="utf-8"?>
+<p:sld xmlns:a="http://schemas.openxmlformats.org/drawingml/2006/main" xmlns:r="http://schemas.openxmlformats.org/officeDocument/2006/relationships" xmlns:p="http://schemas.openxmlformats.org/presentationml/2006/main">
+  <p:cSld>
+    <p:spTree>
+      <p:nvGrpSpPr>
+        <p:cNvPr id="1" name=""/>
+        <p:cNvGrpSpPr/>
+        <p:nvPr/>
+      </p:nvGrpSpPr>
+      <p:grpSpPr>
+        <a:xfrm>
+          <a:off x="0" y="0"/>
+          <a:ext cx="0" cy="0"/>
+          <a:chOff x="0" y="0"/>
+          <a:chExt cx="0" cy="0"/>
+        </a:xfrm>
+      </p:grpSpPr>
+      <p:sp>
+        <p:nvSpPr>
+          <p:cNvPr id="3" name="Text Placeholder 2">
+            <a:extLst>
+              <a:ext uri="{FF2B5EF4-FFF2-40B4-BE49-F238E27FC236}">
+                <a16:creationId xmlns:a16="http://schemas.microsoft.com/office/drawing/2014/main" id="{9C5C3248-2370-C9E3-11C1-066948834FAB}"/>
+              </a:ext>
+            </a:extLst>
+          </p:cNvPr>
+          <p:cNvSpPr>
+            <a:spLocks noGrp="1"/>
+          </p:cNvSpPr>
+          <p:nvPr>
+            <p:ph type="body" sz="quarter" idx="10"/>
+          </p:nvPr>
+        </p:nvSpPr>
+        <p:spPr/>
+        <p:txBody>
+          <a:bodyPr/>
+          <a:lstStyle/>
+          <a:p>
+            <a:r>
+              <a:rPr lang="en-US" dirty="0"/>
+              <a:t>Summary</a:t>
+            </a:r>
+            <a:endParaRPr lang="en-SG" dirty="0"/>
+          </a:p>
+        </p:txBody>
+      </p:sp>
+      <p:sp>
+        <p:nvSpPr>
+          <p:cNvPr id="4" name="Text Placeholder 3">
+            <a:extLst>
+              <a:ext uri="{FF2B5EF4-FFF2-40B4-BE49-F238E27FC236}">
+                <a16:creationId xmlns:a16="http://schemas.microsoft.com/office/drawing/2014/main" id="{50065642-D86B-279C-5916-A4D37347D297}"/>
+              </a:ext>
+            </a:extLst>
+          </p:cNvPr>
+          <p:cNvSpPr>
+            <a:spLocks noGrp="1"/>
+          </p:cNvSpPr>
+          <p:nvPr>
+            <p:ph type="body" sz="quarter" idx="11"/>
+          </p:nvPr>
+        </p:nvSpPr>
+        <p:spPr>
+          <a:xfrm>
+            <a:off x="2979381" y="908277"/>
+            <a:ext cx="5836835" cy="2277133"/>
+          </a:xfrm>
+        </p:spPr>
+        <p:txBody>
+          <a:bodyPr>
+            <a:normAutofit/>
+          </a:bodyPr>
+          <a:lstStyle/>
+          <a:p>
+            <a:pPr marL="342900" indent="-342900" algn="just">
+              <a:buAutoNum type="arabicPeriod"/>
+            </a:pPr>
+            <a:r>
+              <a:rPr lang="en-US" dirty="0"/>
+              <a:t>Refactor user-defined utility functions to another file.</a:t>
+            </a:r>
+          </a:p>
+          <a:p>
+            <a:pPr marL="342900" indent="-342900" algn="just">
+              <a:buAutoNum type="arabicPeriod"/>
+            </a:pPr>
+            <a:r>
+              <a:rPr lang="en-US" dirty="0"/>
+              <a:t>Refactor user-defined libraries to another file.</a:t>
+            </a:r>
+          </a:p>
+          <a:p>
+            <a:pPr marL="342900" indent="-342900" algn="just">
+              <a:buAutoNum type="arabicPeriod"/>
+            </a:pPr>
+            <a:r>
+              <a:rPr lang="en-US" dirty="0"/>
+              <a:t>Use properties and structures to organize variables.</a:t>
+            </a:r>
+          </a:p>
+          <a:p>
+            <a:pPr marL="342900" indent="-342900" algn="just">
+              <a:buAutoNum type="arabicPeriod"/>
+            </a:pPr>
+            <a:r>
+              <a:rPr lang="en-US" dirty="0"/>
+              <a:t>Implement callbacks.</a:t>
+            </a:r>
+          </a:p>
+          <a:p>
+            <a:pPr marL="342900" indent="-342900" algn="just">
+              <a:buAutoNum type="arabicPeriod"/>
+            </a:pPr>
+            <a:r>
+              <a:rPr lang="en-US" dirty="0"/>
+              <a:t>Decrease memory usage by reducing the number of temporary variables.</a:t>
+            </a:r>
+          </a:p>
+          <a:p>
+            <a:pPr marL="342900" indent="-342900" algn="just">
+              <a:buAutoNum type="arabicPeriod"/>
+            </a:pPr>
+            <a:r>
+              <a:rPr lang="en-US" dirty="0"/>
+              <a:t>Perform code vectorization.</a:t>
             </a:r>
           </a:p>
         </p:txBody>
@@ -24097,7 +24344,7 @@
           <p:cNvPr id="5" name="TextBox 4">
             <a:extLst>
               <a:ext uri="{FF2B5EF4-FFF2-40B4-BE49-F238E27FC236}">
-                <a16:creationId xmlns:a16="http://schemas.microsoft.com/office/drawing/2014/main" id="{FCB9B72E-B56A-A243-6995-6D4FAED1173D}"/>
+                <a16:creationId xmlns:a16="http://schemas.microsoft.com/office/drawing/2014/main" id="{4F0CE30C-63F7-B0AC-1CCF-BD03DB4F4DC4}"/>
               </a:ext>
             </a:extLst>
           </p:cNvPr>
@@ -24106,8 +24353,8 @@
         </p:nvSpPr>
         <p:spPr>
           <a:xfrm>
-            <a:off x="3080479" y="2968052"/>
-            <a:ext cx="5461752" cy="507831"/>
+            <a:off x="2979381" y="3727392"/>
+            <a:ext cx="5947462" cy="507831"/>
           </a:xfrm>
           <a:prstGeom prst="rect">
             <a:avLst/>
@@ -24126,7 +24373,7 @@
                   <a:schemeClr val="bg1"/>
                 </a:solidFill>
               </a:rPr>
-              <a:t>Any advices regarding the coding style and code organization that</a:t>
+              <a:t>Any advices regarding the coding style, code organization, and software </a:t>
             </a:r>
           </a:p>
           <a:p>
@@ -24136,7 +24383,7 @@
                   <a:schemeClr val="bg1"/>
                 </a:solidFill>
               </a:rPr>
-              <a:t>will potentially speed up the app designer?</a:t>
+              <a:t>architecture that will potentially speed up the app designer?</a:t>
             </a:r>
             <a:endParaRPr lang="en-SG" dirty="0">
               <a:solidFill>
@@ -24149,7 +24396,7 @@
     </p:spTree>
     <p:extLst>
       <p:ext uri="{BB962C8B-B14F-4D97-AF65-F5344CB8AC3E}">
-        <p14:creationId xmlns:p14="http://schemas.microsoft.com/office/powerpoint/2010/main" val="2509604075"/>
+        <p14:creationId xmlns:p14="http://schemas.microsoft.com/office/powerpoint/2010/main" val="4228211284"/>
       </p:ext>
     </p:extLst>
   </p:cSld>
@@ -24236,8 +24483,22 @@
             </a:pPr>
             <a:r>
               <a:rPr lang="en-US" dirty="0"/>
-              <a:t>Overall design of IPSOMEDT Marine</a:t>
-            </a:r>
+              <a:t>Objective</a:t>
+            </a:r>
+          </a:p>
+          <a:p>
+            <a:pPr marL="342900" indent="-342900">
+              <a:buAutoNum type="arabicPeriod"/>
+            </a:pPr>
+            <a:r>
+              <a:rPr lang="en-US" dirty="0"/>
+              <a:t>Overall design of </a:t>
+            </a:r>
+            <a:r>
+              <a:rPr lang="en-US" dirty="0" err="1"/>
+              <a:t>IPSOMEDT_Marine</a:t>
+            </a:r>
+            <a:endParaRPr lang="en-US" dirty="0"/>
           </a:p>
           <a:p>
             <a:pPr marL="342900" indent="-342900">
@@ -24291,10 +24552,43 @@
       </p:grpSpPr>
       <p:sp>
         <p:nvSpPr>
+          <p:cNvPr id="2" name="Title 1">
+            <a:extLst>
+              <a:ext uri="{FF2B5EF4-FFF2-40B4-BE49-F238E27FC236}">
+                <a16:creationId xmlns:a16="http://schemas.microsoft.com/office/drawing/2014/main" id="{234892BB-F87F-B3C3-4282-8C8301FB0580}"/>
+              </a:ext>
+            </a:extLst>
+          </p:cNvPr>
+          <p:cNvSpPr>
+            <a:spLocks noGrp="1"/>
+          </p:cNvSpPr>
+          <p:nvPr>
+            <p:ph type="title"/>
+          </p:nvPr>
+        </p:nvSpPr>
+        <p:spPr>
+          <a:xfrm>
+            <a:off x="2971884" y="908277"/>
+            <a:ext cx="5836835" cy="695484"/>
+          </a:xfrm>
+        </p:spPr>
+        <p:txBody>
+          <a:bodyPr/>
+          <a:lstStyle/>
+          <a:p>
+            <a:r>
+              <a:rPr lang="en-SG" dirty="0"/>
+              <a:t>Good software architecture:</a:t>
+            </a:r>
+          </a:p>
+        </p:txBody>
+      </p:sp>
+      <p:sp>
+        <p:nvSpPr>
           <p:cNvPr id="3" name="Text Placeholder 2">
             <a:extLst>
               <a:ext uri="{FF2B5EF4-FFF2-40B4-BE49-F238E27FC236}">
-                <a16:creationId xmlns:a16="http://schemas.microsoft.com/office/drawing/2014/main" id="{B9972488-690C-4D18-03BF-2D65AC0FDF17}"/>
+                <a16:creationId xmlns:a16="http://schemas.microsoft.com/office/drawing/2014/main" id="{4A162BA3-3E8A-85A9-1E8D-D25042DC4ED8}"/>
               </a:ext>
             </a:extLst>
           </p:cNvPr>
@@ -24311,47 +24605,91 @@
           <a:lstStyle/>
           <a:p>
             <a:r>
-              <a:rPr lang="en-US" dirty="0"/>
-              <a:t>Overall Design</a:t>
-            </a:r>
-            <a:endParaRPr lang="en-SG" dirty="0"/>
-          </a:p>
-        </p:txBody>
-      </p:sp>
-      <p:pic>
-        <p:nvPicPr>
-          <p:cNvPr id="7" name="Picture 6">
-            <a:extLst>
-              <a:ext uri="{FF2B5EF4-FFF2-40B4-BE49-F238E27FC236}">
-                <a16:creationId xmlns:a16="http://schemas.microsoft.com/office/drawing/2014/main" id="{8DCC9FC3-0128-96C6-0A6C-FE1C2ACA30A1}"/>
-              </a:ext>
-            </a:extLst>
-          </p:cNvPr>
-          <p:cNvPicPr>
-            <a:picLocks noChangeAspect="1"/>
-          </p:cNvPicPr>
-          <p:nvPr/>
-        </p:nvPicPr>
-        <p:blipFill>
-          <a:blip r:embed="rId2"/>
-          <a:stretch>
-            <a:fillRect/>
-          </a:stretch>
-        </p:blipFill>
-        <p:spPr>
-          <a:xfrm>
-            <a:off x="2619310" y="831729"/>
-            <a:ext cx="6203738" cy="3480041"/>
-          </a:xfrm>
-          <a:prstGeom prst="rect">
-            <a:avLst/>
-          </a:prstGeom>
-        </p:spPr>
-      </p:pic>
+              <a:rPr lang="en-SG" dirty="0"/>
+              <a:t>Introduction</a:t>
+            </a:r>
+          </a:p>
+        </p:txBody>
+      </p:sp>
+      <p:sp>
+        <p:nvSpPr>
+          <p:cNvPr id="4" name="Text Placeholder 3">
+            <a:extLst>
+              <a:ext uri="{FF2B5EF4-FFF2-40B4-BE49-F238E27FC236}">
+                <a16:creationId xmlns:a16="http://schemas.microsoft.com/office/drawing/2014/main" id="{4762C196-B8D0-EB72-B551-82E4481AD1F4}"/>
+              </a:ext>
+            </a:extLst>
+          </p:cNvPr>
+          <p:cNvSpPr>
+            <a:spLocks noGrp="1"/>
+          </p:cNvSpPr>
+          <p:nvPr>
+            <p:ph type="body" sz="quarter" idx="11"/>
+          </p:nvPr>
+        </p:nvSpPr>
+        <p:spPr>
+          <a:xfrm>
+            <a:off x="2971883" y="1513557"/>
+            <a:ext cx="5836835" cy="2625725"/>
+          </a:xfrm>
+        </p:spPr>
+        <p:txBody>
+          <a:bodyPr/>
+          <a:lstStyle/>
+          <a:p>
+            <a:r>
+              <a:rPr lang="en-SG" dirty="0"/>
+              <a:t>Readability/Understandability</a:t>
+            </a:r>
+          </a:p>
+          <a:p>
+            <a:r>
+              <a:rPr lang="en-SG" dirty="0"/>
+              <a:t>Maintainability</a:t>
+            </a:r>
+          </a:p>
+          <a:p>
+            <a:r>
+              <a:rPr lang="en-SG" dirty="0"/>
+              <a:t>Scalability </a:t>
+            </a:r>
+          </a:p>
+          <a:p>
+            <a:r>
+              <a:rPr lang="en-SG" dirty="0"/>
+              <a:t>Testability</a:t>
+            </a:r>
+          </a:p>
+          <a:p>
+            <a:r>
+              <a:rPr lang="en-SG" dirty="0"/>
+              <a:t>Reliability/Robustness</a:t>
+            </a:r>
+          </a:p>
+          <a:p>
+            <a:r>
+              <a:rPr lang="en-SG" dirty="0"/>
+              <a:t>Efficiency/Run time</a:t>
+            </a:r>
+          </a:p>
+          <a:p>
+            <a:r>
+              <a:rPr lang="en-SG" dirty="0"/>
+              <a:t>Separation of concerns</a:t>
+            </a:r>
+          </a:p>
+          <a:p>
+            <a:r>
+              <a:rPr lang="en-SG" dirty="0"/>
+              <a:t>Reusability</a:t>
+            </a:r>
+          </a:p>
+        </p:txBody>
+      </p:sp>
     </p:spTree>
     <p:extLst>
       <p:ext uri="{BB962C8B-B14F-4D97-AF65-F5344CB8AC3E}">
-        <p14:creationId xmlns:p14="http://schemas.microsoft.com/office/powerpoint/2010/main" val="3333199845"/>
+        <p14:creationId xmlns:p14="http://schemas.microsoft.com/office/powerpoint/2010/main" val="564243702"/>
       </p:ext>
     </p:extLst>
   </p:cSld>
@@ -24383,7 +24721,7 @@
           <p:cNvPr id="3" name="Text Placeholder 2">
             <a:extLst>
               <a:ext uri="{FF2B5EF4-FFF2-40B4-BE49-F238E27FC236}">
-                <a16:creationId xmlns:a16="http://schemas.microsoft.com/office/drawing/2014/main" id="{EFF5478A-9B06-A40A-65DB-EC9AB6470F99}"/>
+                <a16:creationId xmlns:a16="http://schemas.microsoft.com/office/drawing/2014/main" id="{B9972488-690C-4D18-03BF-2D65AC0FDF17}"/>
               </a:ext>
             </a:extLst>
           </p:cNvPr>
@@ -24401,22 +24739,18 @@
           <a:p>
             <a:r>
               <a:rPr lang="en-US" dirty="0"/>
-              <a:t>Overall</a:t>
-            </a:r>
-            <a:r>
-              <a:rPr lang="en-SG" dirty="0"/>
-              <a:t> Design</a:t>
-            </a:r>
-            <a:endParaRPr lang="en-US" dirty="0"/>
+              <a:t>Overall Design</a:t>
+            </a:r>
+            <a:endParaRPr lang="en-SG" dirty="0"/>
           </a:p>
         </p:txBody>
       </p:sp>
       <p:pic>
         <p:nvPicPr>
-          <p:cNvPr id="6" name="Picture 5">
-            <a:extLst>
-              <a:ext uri="{FF2B5EF4-FFF2-40B4-BE49-F238E27FC236}">
-                <a16:creationId xmlns:a16="http://schemas.microsoft.com/office/drawing/2014/main" id="{7AD1100E-3B40-9034-D808-92DD9E5606C1}"/>
+          <p:cNvPr id="7" name="Picture 6">
+            <a:extLst>
+              <a:ext uri="{FF2B5EF4-FFF2-40B4-BE49-F238E27FC236}">
+                <a16:creationId xmlns:a16="http://schemas.microsoft.com/office/drawing/2014/main" id="{8DCC9FC3-0128-96C6-0A6C-FE1C2ACA30A1}"/>
               </a:ext>
             </a:extLst>
           </p:cNvPr>
@@ -24433,18 +24767,55 @@
         </p:blipFill>
         <p:spPr>
           <a:xfrm>
-            <a:off x="2617961" y="812126"/>
-            <a:ext cx="6301006" cy="3519248"/>
+            <a:off x="2619310" y="1139028"/>
+            <a:ext cx="6203738" cy="3480041"/>
           </a:xfrm>
           <a:prstGeom prst="rect">
             <a:avLst/>
           </a:prstGeom>
         </p:spPr>
       </p:pic>
+      <p:sp>
+        <p:nvSpPr>
+          <p:cNvPr id="4" name="Title 1">
+            <a:extLst>
+              <a:ext uri="{FF2B5EF4-FFF2-40B4-BE49-F238E27FC236}">
+                <a16:creationId xmlns:a16="http://schemas.microsoft.com/office/drawing/2014/main" id="{8AFEFF15-A1F3-57B3-BA2D-7E55596738D2}"/>
+              </a:ext>
+            </a:extLst>
+          </p:cNvPr>
+          <p:cNvSpPr>
+            <a:spLocks noGrp="1"/>
+          </p:cNvSpPr>
+          <p:nvPr>
+            <p:ph type="title"/>
+          </p:nvPr>
+        </p:nvSpPr>
+        <p:spPr>
+          <a:xfrm>
+            <a:off x="2619310" y="337054"/>
+            <a:ext cx="6299657" cy="695484"/>
+          </a:xfrm>
+        </p:spPr>
+        <p:txBody>
+          <a:bodyPr/>
+          <a:lstStyle/>
+          <a:p>
+            <a:r>
+              <a:rPr lang="en-SG" dirty="0" err="1"/>
+              <a:t>Mlapp</a:t>
+            </a:r>
+            <a:r>
+              <a:rPr lang="en-SG" dirty="0"/>
+              <a:t> with different features and functionalities, optimised for use via GUI</a:t>
+            </a:r>
+          </a:p>
+        </p:txBody>
+      </p:sp>
     </p:spTree>
     <p:extLst>
       <p:ext uri="{BB962C8B-B14F-4D97-AF65-F5344CB8AC3E}">
-        <p14:creationId xmlns:p14="http://schemas.microsoft.com/office/powerpoint/2010/main" val="3124998570"/>
+        <p14:creationId xmlns:p14="http://schemas.microsoft.com/office/powerpoint/2010/main" val="3333199845"/>
       </p:ext>
     </p:extLst>
   </p:cSld>
@@ -24473,45 +24844,10 @@
       </p:grpSpPr>
       <p:sp>
         <p:nvSpPr>
-          <p:cNvPr id="2" name="Title 1">
-            <a:extLst>
-              <a:ext uri="{FF2B5EF4-FFF2-40B4-BE49-F238E27FC236}">
-                <a16:creationId xmlns:a16="http://schemas.microsoft.com/office/drawing/2014/main" id="{5B812A57-3B75-B9DA-FB76-AEB8686F8976}"/>
-              </a:ext>
-            </a:extLst>
-          </p:cNvPr>
-          <p:cNvSpPr>
-            <a:spLocks noGrp="1"/>
-          </p:cNvSpPr>
-          <p:nvPr>
-            <p:ph type="title"/>
-          </p:nvPr>
-        </p:nvSpPr>
-        <p:spPr>
-          <a:xfrm>
-            <a:off x="2724547" y="328344"/>
-            <a:ext cx="5836835" cy="695484"/>
-          </a:xfrm>
-        </p:spPr>
-        <p:txBody>
-          <a:bodyPr anchor="ctr"/>
-          <a:lstStyle/>
-          <a:p>
-            <a:pPr algn="ctr"/>
-            <a:r>
-              <a:rPr lang="en-US" dirty="0"/>
-              <a:t>Functions for data computation</a:t>
-            </a:r>
-            <a:endParaRPr lang="en-SG" dirty="0"/>
-          </a:p>
-        </p:txBody>
-      </p:sp>
-      <p:sp>
-        <p:nvSpPr>
           <p:cNvPr id="3" name="Text Placeholder 2">
             <a:extLst>
               <a:ext uri="{FF2B5EF4-FFF2-40B4-BE49-F238E27FC236}">
-                <a16:creationId xmlns:a16="http://schemas.microsoft.com/office/drawing/2014/main" id="{23936BCC-02D6-EFE8-8BA6-BCF909638E61}"/>
+                <a16:creationId xmlns:a16="http://schemas.microsoft.com/office/drawing/2014/main" id="{EFF5478A-9B06-A40A-65DB-EC9AB6470F99}"/>
               </a:ext>
             </a:extLst>
           </p:cNvPr>
@@ -24529,9 +24865,13 @@
           <a:p>
             <a:r>
               <a:rPr lang="en-US" dirty="0"/>
-              <a:t>High-level Architecture</a:t>
-            </a:r>
-            <a:endParaRPr lang="en-SG" dirty="0"/>
+              <a:t>Overall</a:t>
+            </a:r>
+            <a:r>
+              <a:rPr lang="en-SG" dirty="0"/>
+              <a:t> Design</a:t>
+            </a:r>
+            <a:endParaRPr lang="en-US" dirty="0"/>
           </a:p>
         </p:txBody>
       </p:sp>
@@ -24540,7 +24880,7 @@
           <p:cNvPr id="6" name="Picture 5">
             <a:extLst>
               <a:ext uri="{FF2B5EF4-FFF2-40B4-BE49-F238E27FC236}">
-                <a16:creationId xmlns:a16="http://schemas.microsoft.com/office/drawing/2014/main" id="{A4072A5C-ECCF-66F2-55DD-5F50D0A470B4}"/>
+                <a16:creationId xmlns:a16="http://schemas.microsoft.com/office/drawing/2014/main" id="{7AD1100E-3B40-9034-D808-92DD9E5606C1}"/>
               </a:ext>
             </a:extLst>
           </p:cNvPr>
@@ -24557,18 +24897,51 @@
         </p:blipFill>
         <p:spPr>
           <a:xfrm>
-            <a:off x="3773929" y="1386114"/>
-            <a:ext cx="3619814" cy="3154953"/>
+            <a:off x="2617961" y="1256019"/>
+            <a:ext cx="6301006" cy="3519248"/>
           </a:xfrm>
           <a:prstGeom prst="rect">
             <a:avLst/>
           </a:prstGeom>
         </p:spPr>
       </p:pic>
+      <p:sp>
+        <p:nvSpPr>
+          <p:cNvPr id="4" name="Title 1">
+            <a:extLst>
+              <a:ext uri="{FF2B5EF4-FFF2-40B4-BE49-F238E27FC236}">
+                <a16:creationId xmlns:a16="http://schemas.microsoft.com/office/drawing/2014/main" id="{E71FCBDD-EC3C-4FBF-50F7-4B3872502351}"/>
+              </a:ext>
+            </a:extLst>
+          </p:cNvPr>
+          <p:cNvSpPr>
+            <a:spLocks noGrp="1"/>
+          </p:cNvSpPr>
+          <p:nvPr>
+            <p:ph type="title"/>
+          </p:nvPr>
+        </p:nvSpPr>
+        <p:spPr>
+          <a:xfrm>
+            <a:off x="2617961" y="560535"/>
+            <a:ext cx="5836835" cy="695484"/>
+          </a:xfrm>
+        </p:spPr>
+        <p:txBody>
+          <a:bodyPr/>
+          <a:lstStyle/>
+          <a:p>
+            <a:r>
+              <a:rPr lang="en-SG" dirty="0"/>
+              <a:t>Interaction between dialog app and main app</a:t>
+            </a:r>
+          </a:p>
+        </p:txBody>
+      </p:sp>
     </p:spTree>
     <p:extLst>
       <p:ext uri="{BB962C8B-B14F-4D97-AF65-F5344CB8AC3E}">
-        <p14:creationId xmlns:p14="http://schemas.microsoft.com/office/powerpoint/2010/main" val="1730639696"/>
+        <p14:creationId xmlns:p14="http://schemas.microsoft.com/office/powerpoint/2010/main" val="3124998570"/>
       </p:ext>
     </p:extLst>
   </p:cSld>
@@ -24624,7 +24997,7 @@
             <a:pPr algn="ctr"/>
             <a:r>
               <a:rPr lang="en-US" dirty="0"/>
-              <a:t>User-defined libraries</a:t>
+              <a:t>Low-level functions for data computation</a:t>
             </a:r>
             <a:endParaRPr lang="en-SG" dirty="0"/>
           </a:p>
@@ -24661,10 +25034,10 @@
       </p:sp>
       <p:pic>
         <p:nvPicPr>
-          <p:cNvPr id="5" name="Picture 4">
-            <a:extLst>
-              <a:ext uri="{FF2B5EF4-FFF2-40B4-BE49-F238E27FC236}">
-                <a16:creationId xmlns:a16="http://schemas.microsoft.com/office/drawing/2014/main" id="{C9D76A19-ED48-744A-2795-451EBADDB60C}"/>
+          <p:cNvPr id="6" name="Picture 5">
+            <a:extLst>
+              <a:ext uri="{FF2B5EF4-FFF2-40B4-BE49-F238E27FC236}">
+                <a16:creationId xmlns:a16="http://schemas.microsoft.com/office/drawing/2014/main" id="{A4072A5C-ECCF-66F2-55DD-5F50D0A470B4}"/>
               </a:ext>
             </a:extLst>
           </p:cNvPr>
@@ -24681,8 +25054,8 @@
         </p:blipFill>
         <p:spPr>
           <a:xfrm>
-            <a:off x="3821626" y="1386114"/>
-            <a:ext cx="3642676" cy="3124471"/>
+            <a:off x="3773929" y="1386114"/>
+            <a:ext cx="3619814" cy="3154953"/>
           </a:xfrm>
           <a:prstGeom prst="rect">
             <a:avLst/>
@@ -24692,7 +25065,7 @@
     </p:spTree>
     <p:extLst>
       <p:ext uri="{BB962C8B-B14F-4D97-AF65-F5344CB8AC3E}">
-        <p14:creationId xmlns:p14="http://schemas.microsoft.com/office/powerpoint/2010/main" val="2154817488"/>
+        <p14:creationId xmlns:p14="http://schemas.microsoft.com/office/powerpoint/2010/main" val="1730639696"/>
       </p:ext>
     </p:extLst>
   </p:cSld>
@@ -24748,7 +25121,7 @@
             <a:pPr algn="ctr"/>
             <a:r>
               <a:rPr lang="en-US" dirty="0"/>
-              <a:t>Properties</a:t>
+              <a:t>User-defined libraries</a:t>
             </a:r>
             <a:endParaRPr lang="en-SG" dirty="0"/>
           </a:p>
@@ -24788,7 +25161,7 @@
           <p:cNvPr id="5" name="Picture 4">
             <a:extLst>
               <a:ext uri="{FF2B5EF4-FFF2-40B4-BE49-F238E27FC236}">
-                <a16:creationId xmlns:a16="http://schemas.microsoft.com/office/drawing/2014/main" id="{B139999F-5349-3875-6C5F-CBC42D98DAAC}"/>
+                <a16:creationId xmlns:a16="http://schemas.microsoft.com/office/drawing/2014/main" id="{C9D76A19-ED48-744A-2795-451EBADDB60C}"/>
               </a:ext>
             </a:extLst>
           </p:cNvPr>
@@ -24805,8 +25178,8 @@
         </p:blipFill>
         <p:spPr>
           <a:xfrm>
-            <a:off x="4000711" y="1528767"/>
-            <a:ext cx="3284505" cy="2415749"/>
+            <a:off x="3821626" y="1386114"/>
+            <a:ext cx="3642676" cy="3124471"/>
           </a:xfrm>
           <a:prstGeom prst="rect">
             <a:avLst/>
@@ -24816,7 +25189,7 @@
     </p:spTree>
     <p:extLst>
       <p:ext uri="{BB962C8B-B14F-4D97-AF65-F5344CB8AC3E}">
-        <p14:creationId xmlns:p14="http://schemas.microsoft.com/office/powerpoint/2010/main" val="1848890432"/>
+        <p14:creationId xmlns:p14="http://schemas.microsoft.com/office/powerpoint/2010/main" val="2154817488"/>
       </p:ext>
     </p:extLst>
   </p:cSld>
@@ -24872,7 +25245,7 @@
             <a:pPr algn="ctr"/>
             <a:r>
               <a:rPr lang="en-US" dirty="0"/>
-              <a:t>User-defined functions</a:t>
+              <a:t>Properties for data storage and classification</a:t>
             </a:r>
             <a:endParaRPr lang="en-SG" dirty="0"/>
           </a:p>
@@ -24912,7 +25285,7 @@
           <p:cNvPr id="5" name="Picture 4">
             <a:extLst>
               <a:ext uri="{FF2B5EF4-FFF2-40B4-BE49-F238E27FC236}">
-                <a16:creationId xmlns:a16="http://schemas.microsoft.com/office/drawing/2014/main" id="{00E48BD3-1975-830D-5ED1-94F7D1F099CE}"/>
+                <a16:creationId xmlns:a16="http://schemas.microsoft.com/office/drawing/2014/main" id="{B139999F-5349-3875-6C5F-CBC42D98DAAC}"/>
               </a:ext>
             </a:extLst>
           </p:cNvPr>
@@ -24929,8 +25302,8 @@
         </p:blipFill>
         <p:spPr>
           <a:xfrm>
-            <a:off x="3028506" y="1386114"/>
-            <a:ext cx="5228915" cy="2927105"/>
+            <a:off x="4000711" y="1528767"/>
+            <a:ext cx="3284505" cy="2415749"/>
           </a:xfrm>
           <a:prstGeom prst="rect">
             <a:avLst/>
@@ -24940,7 +25313,7 @@
     </p:spTree>
     <p:extLst>
       <p:ext uri="{BB962C8B-B14F-4D97-AF65-F5344CB8AC3E}">
-        <p14:creationId xmlns:p14="http://schemas.microsoft.com/office/powerpoint/2010/main" val="1096363875"/>
+        <p14:creationId xmlns:p14="http://schemas.microsoft.com/office/powerpoint/2010/main" val="1848890432"/>
       </p:ext>
     </p:extLst>
   </p:cSld>
@@ -24996,7 +25369,7 @@
             <a:pPr algn="ctr"/>
             <a:r>
               <a:rPr lang="en-US" dirty="0"/>
-              <a:t>Callbacks</a:t>
+              <a:t>User-defined functions to handle data types and data structures (i.e., for data manipulation purpose)</a:t>
             </a:r>
             <a:endParaRPr lang="en-SG" dirty="0"/>
           </a:p>
@@ -25036,7 +25409,7 @@
           <p:cNvPr id="5" name="Picture 4">
             <a:extLst>
               <a:ext uri="{FF2B5EF4-FFF2-40B4-BE49-F238E27FC236}">
-                <a16:creationId xmlns:a16="http://schemas.microsoft.com/office/drawing/2014/main" id="{19C816E3-EDFB-A607-66DD-E0CA9C09CEF0}"/>
+                <a16:creationId xmlns:a16="http://schemas.microsoft.com/office/drawing/2014/main" id="{00E48BD3-1975-830D-5ED1-94F7D1F099CE}"/>
               </a:ext>
             </a:extLst>
           </p:cNvPr>
@@ -25053,8 +25426,8 @@
         </p:blipFill>
         <p:spPr>
           <a:xfrm>
-            <a:off x="4559425" y="1191552"/>
-            <a:ext cx="2167077" cy="3505566"/>
+            <a:off x="3028506" y="1386114"/>
+            <a:ext cx="5228915" cy="2927105"/>
           </a:xfrm>
           <a:prstGeom prst="rect">
             <a:avLst/>
@@ -25064,7 +25437,7 @@
     </p:spTree>
     <p:extLst>
       <p:ext uri="{BB962C8B-B14F-4D97-AF65-F5344CB8AC3E}">
-        <p14:creationId xmlns:p14="http://schemas.microsoft.com/office/powerpoint/2010/main" val="2060025825"/>
+        <p14:creationId xmlns:p14="http://schemas.microsoft.com/office/powerpoint/2010/main" val="1096363875"/>
       </p:ext>
     </p:extLst>
   </p:cSld>

</xml_diff>